<commit_message>
compressed the pptx copy's image because there apparently is a 1MB file limit....
</commit_message>
<xml_diff>
--- a/PDE_Sprint_1 2.pptx
+++ b/PDE_Sprint_1 2.pptx
@@ -372,7 +372,7 @@
               <a:pPr>
                 <a:defRPr/>
               </a:pPr>
-              <a:t>‹nº›</a:t>
+              <a:t>‹#›</a:t>
             </a:fld>
             <a:endParaRPr lang="en-US"/>
           </a:p>
@@ -663,7 +663,7 @@
               <a:pPr>
                 <a:defRPr/>
               </a:pPr>
-              <a:t>‹nº›</a:t>
+              <a:t>‹#›</a:t>
             </a:fld>
             <a:endParaRPr lang="en-US"/>
           </a:p>
@@ -984,17 +984,17 @@
           </a:ln>
           <a:extLst>
             <a:ext uri="{FAA26D3D-D897-4be2-8F04-BA451C77F1D7}">
-              <ma14:placeholderFlag xmlns="" xmlns:ma14="http://schemas.microsoft.com/office/mac/drawingml/2011/main" val="1"/>
+              <ma14:placeholderFlag xmlns:ma14="http://schemas.microsoft.com/office/mac/drawingml/2011/main" xmlns="" val="1"/>
             </a:ext>
             <a:ext uri="{909E8E84-426E-40dd-AFC4-6F175D3DCCD1}">
-              <a14:hiddenFill xmlns="" xmlns:a14="http://schemas.microsoft.com/office/drawing/2010/main">
+              <a14:hiddenFill xmlns:a14="http://schemas.microsoft.com/office/drawing/2010/main" xmlns="">
                 <a:solidFill>
                   <a:srgbClr val="FFFFFF"/>
                 </a:solidFill>
               </a14:hiddenFill>
             </a:ext>
             <a:ext uri="{91240B29-F687-4f45-9708-019B960494DF}">
-              <a14:hiddenLine xmlns="" xmlns:a14="http://schemas.microsoft.com/office/drawing/2010/main" w="9525">
+              <a14:hiddenLine xmlns:a14="http://schemas.microsoft.com/office/drawing/2010/main" xmlns="" w="9525">
                 <a:solidFill>
                   <a:srgbClr val="000000"/>
                 </a:solidFill>
@@ -1462,7 +1462,7 @@
               <a:pPr>
                 <a:defRPr/>
               </a:pPr>
-              <a:t>‹nº›</a:t>
+              <a:t>‹#›</a:t>
             </a:fld>
             <a:endParaRPr lang="en-US" dirty="0"/>
           </a:p>
@@ -1667,7 +1667,7 @@
               <a:pPr>
                 <a:defRPr/>
               </a:pPr>
-              <a:t>‹nº›</a:t>
+              <a:t>‹#›</a:t>
             </a:fld>
             <a:endParaRPr lang="en-US" dirty="0"/>
           </a:p>
@@ -1898,7 +1898,7 @@
               <a:pPr>
                 <a:defRPr/>
               </a:pPr>
-              <a:t>‹nº›</a:t>
+              <a:t>‹#›</a:t>
             </a:fld>
             <a:endParaRPr lang="en-US" dirty="0"/>
           </a:p>
@@ -2117,7 +2117,7 @@
               <a:pPr>
                 <a:defRPr/>
               </a:pPr>
-              <a:t>‹nº›</a:t>
+              <a:t>‹#›</a:t>
             </a:fld>
             <a:endParaRPr lang="en-US" dirty="0"/>
           </a:p>
@@ -2263,17 +2263,17 @@
           </a:ln>
           <a:extLst>
             <a:ext uri="{FAA26D3D-D897-4be2-8F04-BA451C77F1D7}">
-              <ma14:placeholderFlag xmlns="" xmlns:ma14="http://schemas.microsoft.com/office/mac/drawingml/2011/main" val="1"/>
+              <ma14:placeholderFlag xmlns:ma14="http://schemas.microsoft.com/office/mac/drawingml/2011/main" xmlns="" val="1"/>
             </a:ext>
             <a:ext uri="{909E8E84-426E-40dd-AFC4-6F175D3DCCD1}">
-              <a14:hiddenFill xmlns="" xmlns:a14="http://schemas.microsoft.com/office/drawing/2010/main">
+              <a14:hiddenFill xmlns:a14="http://schemas.microsoft.com/office/drawing/2010/main" xmlns="">
                 <a:solidFill>
                   <a:srgbClr val="FFFFFF"/>
                 </a:solidFill>
               </a14:hiddenFill>
             </a:ext>
             <a:ext uri="{91240B29-F687-4f45-9708-019B960494DF}">
-              <a14:hiddenLine xmlns="" xmlns:a14="http://schemas.microsoft.com/office/drawing/2010/main" w="9525">
+              <a14:hiddenLine xmlns:a14="http://schemas.microsoft.com/office/drawing/2010/main" xmlns="" w="9525">
                 <a:solidFill>
                   <a:srgbClr val="000000"/>
                 </a:solidFill>
@@ -2324,17 +2324,17 @@
           </a:ln>
           <a:extLst>
             <a:ext uri="{FAA26D3D-D897-4be2-8F04-BA451C77F1D7}">
-              <ma14:placeholderFlag xmlns="" xmlns:ma14="http://schemas.microsoft.com/office/mac/drawingml/2011/main" val="1"/>
+              <ma14:placeholderFlag xmlns:ma14="http://schemas.microsoft.com/office/mac/drawingml/2011/main" xmlns="" val="1"/>
             </a:ext>
             <a:ext uri="{909E8E84-426E-40dd-AFC4-6F175D3DCCD1}">
-              <a14:hiddenFill xmlns="" xmlns:a14="http://schemas.microsoft.com/office/drawing/2010/main">
+              <a14:hiddenFill xmlns:a14="http://schemas.microsoft.com/office/drawing/2010/main" xmlns="">
                 <a:solidFill>
                   <a:srgbClr val="FFFFFF"/>
                 </a:solidFill>
               </a14:hiddenFill>
             </a:ext>
             <a:ext uri="{91240B29-F687-4f45-9708-019B960494DF}">
-              <a14:hiddenLine xmlns="" xmlns:a14="http://schemas.microsoft.com/office/drawing/2010/main" w="9525">
+              <a14:hiddenLine xmlns:a14="http://schemas.microsoft.com/office/drawing/2010/main" xmlns="" w="9525">
                 <a:solidFill>
                   <a:srgbClr val="000000"/>
                 </a:solidFill>
@@ -2421,7 +2421,7 @@
               <a:pPr>
                 <a:defRPr/>
               </a:pPr>
-              <a:t>‹nº›</a:t>
+              <a:t>‹#›</a:t>
             </a:fld>
             <a:endParaRPr lang="en-US" dirty="0"/>
           </a:p>
@@ -2544,7 +2544,7 @@
           </a:ln>
           <a:extLst>
             <a:ext uri="{909E8E84-426E-40dd-AFC4-6F175D3DCCD1}">
-              <a14:hiddenFill xmlns="" xmlns:a14="http://schemas.microsoft.com/office/drawing/2010/main">
+              <a14:hiddenFill xmlns:a14="http://schemas.microsoft.com/office/drawing/2010/main" xmlns="">
                 <a:solidFill>
                   <a:srgbClr val="FFFFFF">
                     <a:alpha val="50000"/>
@@ -2553,7 +2553,7 @@
               </a14:hiddenFill>
             </a:ext>
             <a:ext uri="{91240B29-F687-4f45-9708-019B960494DF}">
-              <a14:hiddenLine xmlns="" xmlns:a14="http://schemas.microsoft.com/office/drawing/2010/main" w="9525">
+              <a14:hiddenLine xmlns:a14="http://schemas.microsoft.com/office/drawing/2010/main" xmlns="" w="9525">
                 <a:solidFill>
                   <a:srgbClr val="000000"/>
                 </a:solidFill>
@@ -3387,7 +3387,13 @@
             <p:nvPr/>
           </p:nvPicPr>
           <p:blipFill>
-            <a:blip r:embed="rId2"/>
+            <a:blip r:embed="rId2" cstate="hqprint">
+              <a:extLst>
+                <a:ext uri="{28A0092B-C50C-407E-A947-70E740481C1C}">
+                  <a14:useLocalDpi xmlns:a14="http://schemas.microsoft.com/office/drawing/2010/main"/>
+                </a:ext>
+              </a:extLst>
+            </a:blip>
             <a:stretch>
               <a:fillRect/>
             </a:stretch>
@@ -3417,7 +3423,13 @@
             <p:nvPr/>
           </p:nvPicPr>
           <p:blipFill>
-            <a:blip r:embed="rId3"/>
+            <a:blip r:embed="rId3" cstate="hqprint">
+              <a:extLst>
+                <a:ext uri="{28A0092B-C50C-407E-A947-70E740481C1C}">
+                  <a14:useLocalDpi xmlns:a14="http://schemas.microsoft.com/office/drawing/2010/main"/>
+                </a:ext>
+              </a:extLst>
+            </a:blip>
             <a:stretch>
               <a:fillRect/>
             </a:stretch>
@@ -3547,7 +3559,13 @@
             <p:nvPr/>
           </p:nvPicPr>
           <p:blipFill>
-            <a:blip r:embed="rId4"/>
+            <a:blip r:embed="rId4" cstate="hqprint">
+              <a:extLst>
+                <a:ext uri="{28A0092B-C50C-407E-A947-70E740481C1C}">
+                  <a14:useLocalDpi xmlns:a14="http://schemas.microsoft.com/office/drawing/2010/main"/>
+                </a:ext>
+              </a:extLst>
+            </a:blip>
             <a:stretch>
               <a:fillRect/>
             </a:stretch>

</xml_diff>